<commit_message>
Update BC4 RECOMMENDER SYSTEM.pptx
</commit_message>
<xml_diff>
--- a/BC4/BC4 RECOMMENDER SYSTEM.pptx
+++ b/BC4/BC4 RECOMMENDER SYSTEM.pptx
@@ -133,7 +133,7 @@
 <file path=ppt/revisionInfo.xml><?xml version="1.0" encoding="utf-8"?>
 <p1510:revInfo xmlns:a="http://schemas.openxmlformats.org/drawingml/2006/main" xmlns:r="http://schemas.openxmlformats.org/officeDocument/2006/relationships" xmlns:p1510="http://schemas.microsoft.com/office/powerpoint/2015/10/main">
   <p1510:revLst>
-    <p1510:client id="{F3C4CD14-66FD-4F90-BB11-7D9C8561F3F0}" v="40" dt="2021-05-02T22:03:50.857"/>
+    <p1510:client id="{F3C4CD14-66FD-4F90-BB11-7D9C8561F3F0}" v="52" dt="2021-05-02T22:24:38.678"/>
   </p1510:revLst>
 </p1510:revInfo>
 </file>
@@ -143,7 +143,7 @@
   <pc:docChgLst>
     <pc:chgData name="Debora Santos" userId="a64d79716d8b1654" providerId="LiveId" clId="{F3C4CD14-66FD-4F90-BB11-7D9C8561F3F0}"/>
     <pc:docChg chg="undo custSel delSld modSld sldOrd">
-      <pc:chgData name="Debora Santos" userId="a64d79716d8b1654" providerId="LiveId" clId="{F3C4CD14-66FD-4F90-BB11-7D9C8561F3F0}" dt="2021-05-02T22:06:11.052" v="1683" actId="1076"/>
+      <pc:chgData name="Debora Santos" userId="a64d79716d8b1654" providerId="LiveId" clId="{F3C4CD14-66FD-4F90-BB11-7D9C8561F3F0}" dt="2021-05-02T22:24:38.677" v="1709" actId="1076"/>
       <pc:docMkLst>
         <pc:docMk/>
       </pc:docMkLst>
@@ -464,7 +464,7 @@
         </pc:grpChg>
       </pc:sldChg>
       <pc:sldChg chg="addSp delSp modSp mod">
-        <pc:chgData name="Debora Santos" userId="a64d79716d8b1654" providerId="LiveId" clId="{F3C4CD14-66FD-4F90-BB11-7D9C8561F3F0}" dt="2021-05-02T21:56:00.491" v="1046" actId="20577"/>
+        <pc:chgData name="Debora Santos" userId="a64d79716d8b1654" providerId="LiveId" clId="{F3C4CD14-66FD-4F90-BB11-7D9C8561F3F0}" dt="2021-05-02T22:24:38.677" v="1709" actId="1076"/>
         <pc:sldMkLst>
           <pc:docMk/>
           <pc:sldMk cId="3566596741" sldId="363"/>
@@ -477,8 +477,8 @@
             <ac:spMk id="2" creationId="{11D9E90E-C889-4E79-B4CB-A165B09FB779}"/>
           </ac:spMkLst>
         </pc:spChg>
-        <pc:spChg chg="add mod">
-          <ac:chgData name="Debora Santos" userId="a64d79716d8b1654" providerId="LiveId" clId="{F3C4CD14-66FD-4F90-BB11-7D9C8561F3F0}" dt="2021-05-02T21:54:00.500" v="996" actId="571"/>
+        <pc:spChg chg="add del mod">
+          <ac:chgData name="Debora Santos" userId="a64d79716d8b1654" providerId="LiveId" clId="{F3C4CD14-66FD-4F90-BB11-7D9C8561F3F0}" dt="2021-05-02T22:21:16.019" v="1685" actId="478"/>
           <ac:spMkLst>
             <pc:docMk/>
             <pc:sldMk cId="3566596741" sldId="363"/>
@@ -629,6 +629,54 @@
             <ac:grpSpMk id="31" creationId="{A5637F94-4EBC-4BB7-A39A-39A0A162553F}"/>
           </ac:grpSpMkLst>
         </pc:grpChg>
+        <pc:picChg chg="add mod">
+          <ac:chgData name="Debora Santos" userId="a64d79716d8b1654" providerId="LiveId" clId="{F3C4CD14-66FD-4F90-BB11-7D9C8561F3F0}" dt="2021-05-02T22:24:16.537" v="1702" actId="14100"/>
+          <ac:picMkLst>
+            <pc:docMk/>
+            <pc:sldMk cId="3566596741" sldId="363"/>
+            <ac:picMk id="6" creationId="{B5922DCE-2681-4535-BB8B-F87516A4CFFE}"/>
+          </ac:picMkLst>
+        </pc:picChg>
+        <pc:picChg chg="add mod">
+          <ac:chgData name="Debora Santos" userId="a64d79716d8b1654" providerId="LiveId" clId="{F3C4CD14-66FD-4F90-BB11-7D9C8561F3F0}" dt="2021-05-02T22:23:54.984" v="1696" actId="1076"/>
+          <ac:picMkLst>
+            <pc:docMk/>
+            <pc:sldMk cId="3566596741" sldId="363"/>
+            <ac:picMk id="10" creationId="{7727AE18-A590-41F0-8354-18A3F9C358DA}"/>
+          </ac:picMkLst>
+        </pc:picChg>
+        <pc:picChg chg="add mod">
+          <ac:chgData name="Debora Santos" userId="a64d79716d8b1654" providerId="LiveId" clId="{F3C4CD14-66FD-4F90-BB11-7D9C8561F3F0}" dt="2021-05-02T22:23:47.878" v="1693" actId="1076"/>
+          <ac:picMkLst>
+            <pc:docMk/>
+            <pc:sldMk cId="3566596741" sldId="363"/>
+            <ac:picMk id="21" creationId="{E3D67533-F5CE-4AC5-8B17-150DC20241B3}"/>
+          </ac:picMkLst>
+        </pc:picChg>
+        <pc:picChg chg="del mod">
+          <ac:chgData name="Debora Santos" userId="a64d79716d8b1654" providerId="LiveId" clId="{F3C4CD14-66FD-4F90-BB11-7D9C8561F3F0}" dt="2021-05-02T22:21:36.491" v="1687" actId="478"/>
+          <ac:picMkLst>
+            <pc:docMk/>
+            <pc:sldMk cId="3566596741" sldId="363"/>
+            <ac:picMk id="55" creationId="{0C1C832B-C63B-45C9-B9D8-5A572EA33467}"/>
+          </ac:picMkLst>
+        </pc:picChg>
+        <pc:picChg chg="add del mod">
+          <ac:chgData name="Debora Santos" userId="a64d79716d8b1654" providerId="LiveId" clId="{F3C4CD14-66FD-4F90-BB11-7D9C8561F3F0}" dt="2021-05-02T22:24:17.569" v="1703"/>
+          <ac:picMkLst>
+            <pc:docMk/>
+            <pc:sldMk cId="3566596741" sldId="363"/>
+            <ac:picMk id="1026" creationId="{3B41AD66-A17B-408E-87D2-68FB90063130}"/>
+          </ac:picMkLst>
+        </pc:picChg>
+        <pc:picChg chg="add mod">
+          <ac:chgData name="Debora Santos" userId="a64d79716d8b1654" providerId="LiveId" clId="{F3C4CD14-66FD-4F90-BB11-7D9C8561F3F0}" dt="2021-05-02T22:24:38.677" v="1709" actId="1076"/>
+          <ac:picMkLst>
+            <pc:docMk/>
+            <pc:sldMk cId="3566596741" sldId="363"/>
+            <ac:picMk id="1028" creationId="{3DBBDD03-2662-467B-AAF0-3D7051DDB5EB}"/>
+          </ac:picMkLst>
+        </pc:picChg>
       </pc:sldChg>
       <pc:sldChg chg="addSp delSp modSp mod ord">
         <pc:chgData name="Debora Santos" userId="a64d79716d8b1654" providerId="LiveId" clId="{F3C4CD14-66FD-4F90-BB11-7D9C8561F3F0}" dt="2021-05-02T21:53:47.174" v="994" actId="1076"/>
@@ -27840,42 +27888,6 @@
       </p:sp>
       <p:pic>
         <p:nvPicPr>
-          <p:cNvPr id="55" name="Imagem 54">
-            <a:extLst>
-              <a:ext uri="{FF2B5EF4-FFF2-40B4-BE49-F238E27FC236}">
-                <a16:creationId xmlns:a16="http://schemas.microsoft.com/office/drawing/2014/main" id="{0C1C832B-C63B-45C9-B9D8-5A572EA33467}"/>
-              </a:ext>
-            </a:extLst>
-          </p:cNvPr>
-          <p:cNvPicPr>
-            <a:picLocks noChangeAspect="1"/>
-          </p:cNvPicPr>
-          <p:nvPr/>
-        </p:nvPicPr>
-        <p:blipFill>
-          <a:blip r:embed="rId2" cstate="print">
-            <a:extLst>
-              <a:ext uri="{28A0092B-C50C-407E-A947-70E740481C1C}">
-                <a14:useLocalDpi xmlns:a14="http://schemas.microsoft.com/office/drawing/2010/main" val="0"/>
-              </a:ext>
-            </a:extLst>
-          </a:blip>
-          <a:stretch>
-            <a:fillRect/>
-          </a:stretch>
-        </p:blipFill>
-        <p:spPr>
-          <a:xfrm>
-            <a:off x="824405" y="2254948"/>
-            <a:ext cx="3257704" cy="2327426"/>
-          </a:xfrm>
-          <a:prstGeom prst="rect">
-            <a:avLst/>
-          </a:prstGeom>
-        </p:spPr>
-      </p:pic>
-      <p:pic>
-        <p:nvPicPr>
           <p:cNvPr id="58" name="Imagem 57">
             <a:extLst>
               <a:ext uri="{FF2B5EF4-FFF2-40B4-BE49-F238E27FC236}">
@@ -27889,7 +27901,7 @@
           <p:nvPr/>
         </p:nvPicPr>
         <p:blipFill>
-          <a:blip r:embed="rId3">
+          <a:blip r:embed="rId2">
             <a:extLst>
               <a:ext uri="{28A0092B-C50C-407E-A947-70E740481C1C}">
                 <a14:useLocalDpi xmlns:a14="http://schemas.microsoft.com/office/drawing/2010/main" val="0"/>
@@ -27910,57 +27922,6 @@
           </a:prstGeom>
         </p:spPr>
       </p:pic>
-      <p:sp>
-        <p:nvSpPr>
-          <p:cNvPr id="17" name="CaixaDeTexto 11">
-            <a:extLst>
-              <a:ext uri="{FF2B5EF4-FFF2-40B4-BE49-F238E27FC236}">
-                <a16:creationId xmlns:a16="http://schemas.microsoft.com/office/drawing/2014/main" id="{A0395673-5C9D-49BD-A578-7597DF448C0D}"/>
-              </a:ext>
-            </a:extLst>
-          </p:cNvPr>
-          <p:cNvSpPr txBox="1"/>
-          <p:nvPr/>
-        </p:nvSpPr>
-        <p:spPr>
-          <a:xfrm>
-            <a:off x="1896391" y="1290556"/>
-            <a:ext cx="2447009" cy="400110"/>
-          </a:xfrm>
-          <a:prstGeom prst="rect">
-            <a:avLst/>
-          </a:prstGeom>
-          <a:noFill/>
-        </p:spPr>
-        <p:txBody>
-          <a:bodyPr wrap="square">
-            <a:spAutoFit/>
-          </a:bodyPr>
-          <a:lstStyle/>
-          <a:p>
-            <a:pPr lvl="0" algn="just">
-              <a:spcBef>
-                <a:spcPts val="600"/>
-              </a:spcBef>
-            </a:pPr>
-            <a:r>
-              <a:rPr lang="en-US" sz="2000" dirty="0">
-                <a:solidFill>
-                  <a:schemeClr val="accent2">
-                    <a:lumMod val="60000"/>
-                    <a:lumOff val="40000"/>
-                  </a:schemeClr>
-                </a:solidFill>
-                <a:effectLst/>
-                <a:latin typeface="Calibri" panose="020F0502020204030204" pitchFamily="34" charset="0"/>
-                <a:ea typeface="Calibri" panose="020F0502020204030204" pitchFamily="34" charset="0"/>
-                <a:cs typeface="Times New Roman" panose="02020603050405020304" pitchFamily="18" charset="0"/>
-              </a:rPr>
-              <a:t>Algorithm</a:t>
-            </a:r>
-          </a:p>
-        </p:txBody>
-      </p:sp>
       <p:grpSp>
         <p:nvGrpSpPr>
           <p:cNvPr id="18" name="Group 269">
@@ -29044,6 +29005,143 @@
           </p:sp>
         </p:grpSp>
       </p:grpSp>
+      <p:pic>
+        <p:nvPicPr>
+          <p:cNvPr id="6" name="Picture 5">
+            <a:extLst>
+              <a:ext uri="{FF2B5EF4-FFF2-40B4-BE49-F238E27FC236}">
+                <a16:creationId xmlns:a16="http://schemas.microsoft.com/office/drawing/2014/main" id="{B5922DCE-2681-4535-BB8B-F87516A4CFFE}"/>
+              </a:ext>
+            </a:extLst>
+          </p:cNvPr>
+          <p:cNvPicPr>
+            <a:picLocks noChangeAspect="1"/>
+          </p:cNvPicPr>
+          <p:nvPr/>
+        </p:nvPicPr>
+        <p:blipFill>
+          <a:blip r:embed="rId3"/>
+          <a:stretch>
+            <a:fillRect/>
+          </a:stretch>
+        </p:blipFill>
+        <p:spPr>
+          <a:xfrm>
+            <a:off x="5081587" y="1251977"/>
+            <a:ext cx="2638425" cy="1333500"/>
+          </a:xfrm>
+          <a:prstGeom prst="rect">
+            <a:avLst/>
+          </a:prstGeom>
+        </p:spPr>
+      </p:pic>
+      <p:pic>
+        <p:nvPicPr>
+          <p:cNvPr id="10" name="Picture 9">
+            <a:extLst>
+              <a:ext uri="{FF2B5EF4-FFF2-40B4-BE49-F238E27FC236}">
+                <a16:creationId xmlns:a16="http://schemas.microsoft.com/office/drawing/2014/main" id="{7727AE18-A590-41F0-8354-18A3F9C358DA}"/>
+              </a:ext>
+            </a:extLst>
+          </p:cNvPr>
+          <p:cNvPicPr>
+            <a:picLocks noChangeAspect="1"/>
+          </p:cNvPicPr>
+          <p:nvPr/>
+        </p:nvPicPr>
+        <p:blipFill>
+          <a:blip r:embed="rId4"/>
+          <a:stretch>
+            <a:fillRect/>
+          </a:stretch>
+        </p:blipFill>
+        <p:spPr>
+          <a:xfrm>
+            <a:off x="8196221" y="1228164"/>
+            <a:ext cx="3371850" cy="1381125"/>
+          </a:xfrm>
+          <a:prstGeom prst="rect">
+            <a:avLst/>
+          </a:prstGeom>
+        </p:spPr>
+      </p:pic>
+      <p:pic>
+        <p:nvPicPr>
+          <p:cNvPr id="21" name="Picture 20">
+            <a:extLst>
+              <a:ext uri="{FF2B5EF4-FFF2-40B4-BE49-F238E27FC236}">
+                <a16:creationId xmlns:a16="http://schemas.microsoft.com/office/drawing/2014/main" id="{E3D67533-F5CE-4AC5-8B17-150DC20241B3}"/>
+              </a:ext>
+            </a:extLst>
+          </p:cNvPr>
+          <p:cNvPicPr>
+            <a:picLocks noChangeAspect="1"/>
+          </p:cNvPicPr>
+          <p:nvPr/>
+        </p:nvPicPr>
+        <p:blipFill>
+          <a:blip r:embed="rId5"/>
+          <a:stretch>
+            <a:fillRect/>
+          </a:stretch>
+        </p:blipFill>
+        <p:spPr>
+          <a:xfrm>
+            <a:off x="7355966" y="4119024"/>
+            <a:ext cx="2362200" cy="1266825"/>
+          </a:xfrm>
+          <a:prstGeom prst="rect">
+            <a:avLst/>
+          </a:prstGeom>
+        </p:spPr>
+      </p:pic>
+      <p:pic>
+        <p:nvPicPr>
+          <p:cNvPr id="1028" name="Picture 4">
+            <a:extLst>
+              <a:ext uri="{FF2B5EF4-FFF2-40B4-BE49-F238E27FC236}">
+                <a16:creationId xmlns:a16="http://schemas.microsoft.com/office/drawing/2014/main" id="{3DBBDD03-2662-467B-AAF0-3D7051DDB5EB}"/>
+              </a:ext>
+            </a:extLst>
+          </p:cNvPr>
+          <p:cNvPicPr>
+            <a:picLocks noChangeAspect="1" noChangeArrowheads="1"/>
+          </p:cNvPicPr>
+          <p:nvPr/>
+        </p:nvPicPr>
+        <p:blipFill>
+          <a:blip r:embed="rId6">
+            <a:extLst>
+              <a:ext uri="{28A0092B-C50C-407E-A947-70E740481C1C}">
+                <a14:useLocalDpi xmlns:a14="http://schemas.microsoft.com/office/drawing/2010/main" val="0"/>
+              </a:ext>
+            </a:extLst>
+          </a:blip>
+          <a:srcRect/>
+          <a:stretch>
+            <a:fillRect/>
+          </a:stretch>
+        </p:blipFill>
+        <p:spPr bwMode="auto">
+          <a:xfrm>
+            <a:off x="812285" y="2503954"/>
+            <a:ext cx="3435184" cy="2469956"/>
+          </a:xfrm>
+          <a:prstGeom prst="rect">
+            <a:avLst/>
+          </a:prstGeom>
+          <a:noFill/>
+          <a:extLst>
+            <a:ext uri="{909E8E84-426E-40DD-AFC4-6F175D3DCCD1}">
+              <a14:hiddenFill xmlns:a14="http://schemas.microsoft.com/office/drawing/2010/main">
+                <a:solidFill>
+                  <a:srgbClr val="FFFFFF"/>
+                </a:solidFill>
+              </a14:hiddenFill>
+            </a:ext>
+          </a:extLst>
+        </p:spPr>
+      </p:pic>
     </p:spTree>
     <p:extLst>
       <p:ext uri="{BB962C8B-B14F-4D97-AF65-F5344CB8AC3E}">

</xml_diff>